<commit_message>
Fixed some typos and added in Resources
</commit_message>
<xml_diff>
--- a/PitchPresentationACR_Edits.pptx
+++ b/PitchPresentationACR_Edits.pptx
@@ -5,7 +5,7 @@
     <p:sldMasterId id="2147483659" r:id="rId1"/>
   </p:sldMasterIdLst>
   <p:notesMasterIdLst>
-    <p:notesMasterId r:id="rId16"/>
+    <p:notesMasterId r:id="rId17"/>
   </p:notesMasterIdLst>
   <p:sldIdLst>
     <p:sldId id="256" r:id="rId2"/>
@@ -22,6 +22,7 @@
     <p:sldId id="265" r:id="rId13"/>
     <p:sldId id="266" r:id="rId14"/>
     <p:sldId id="267" r:id="rId15"/>
+    <p:sldId id="270" r:id="rId16"/>
   </p:sldIdLst>
   <p:sldSz cx="12192000" cy="6858000"/>
   <p:notesSz cx="6858000" cy="9144000"/>
@@ -254,6 +255,11 @@
       </a:defRPr>
     </a:lvl9pPr>
   </p:defaultTextStyle>
+  <p:extLst>
+    <p:ext uri="{EFAFB233-063F-42B5-8137-9DF3F51BA10A}">
+      <p15:sldGuideLst xmlns:p15="http://schemas.microsoft.com/office/powerpoint/2012/main"/>
+    </p:ext>
+  </p:extLst>
 </p:presentation>
 </file>
 
@@ -1285,8 +1291,8 @@
         </p:nvSpPr>
         <p:spPr>
           <a:xfrm>
-            <a:off x="1143225" y="685800"/>
-            <a:ext cx="4572225" cy="3429000"/>
+            <a:off x="381000" y="685800"/>
+            <a:ext cx="6096000" cy="3429000"/>
           </a:xfrm>
           <a:custGeom>
             <a:avLst/>
@@ -1389,8 +1395,8 @@
         </p:nvSpPr>
         <p:spPr>
           <a:xfrm>
-            <a:off x="1143225" y="685800"/>
-            <a:ext cx="4572225" cy="3429000"/>
+            <a:off x="381000" y="685800"/>
+            <a:ext cx="6096000" cy="3429000"/>
           </a:xfrm>
           <a:custGeom>
             <a:avLst/>
@@ -15215,6 +15221,152 @@
 </p:sld>
 </file>
 
+<file path=ppt/slides/slide15.xml><?xml version="1.0" encoding="utf-8"?>
+<p:sld xmlns:a="http://schemas.openxmlformats.org/drawingml/2006/main" xmlns:r="http://schemas.openxmlformats.org/officeDocument/2006/relationships" xmlns:p="http://schemas.openxmlformats.org/presentationml/2006/main">
+  <p:cSld>
+    <p:spTree>
+      <p:nvGrpSpPr>
+        <p:cNvPr id="1" name=""/>
+        <p:cNvGrpSpPr/>
+        <p:nvPr/>
+      </p:nvGrpSpPr>
+      <p:grpSpPr>
+        <a:xfrm>
+          <a:off x="0" y="0"/>
+          <a:ext cx="0" cy="0"/>
+          <a:chOff x="0" y="0"/>
+          <a:chExt cx="0" cy="0"/>
+        </a:xfrm>
+      </p:grpSpPr>
+      <p:sp>
+        <p:nvSpPr>
+          <p:cNvPr id="2" name="Title 1">
+            <a:extLst>
+              <a:ext uri="{FF2B5EF4-FFF2-40B4-BE49-F238E27FC236}">
+                <a16:creationId xmlns:a16="http://schemas.microsoft.com/office/drawing/2014/main" id="{DFB61F5C-67BA-8840-A139-EBC588BAF37E}"/>
+              </a:ext>
+            </a:extLst>
+          </p:cNvPr>
+          <p:cNvSpPr>
+            <a:spLocks noGrp="1"/>
+          </p:cNvSpPr>
+          <p:nvPr>
+            <p:ph type="title"/>
+          </p:nvPr>
+        </p:nvSpPr>
+        <p:spPr/>
+        <p:txBody>
+          <a:bodyPr/>
+          <a:lstStyle/>
+          <a:p>
+            <a:r>
+              <a:rPr lang="en-US" dirty="0"/>
+              <a:t>Resources</a:t>
+            </a:r>
+          </a:p>
+        </p:txBody>
+      </p:sp>
+      <p:sp>
+        <p:nvSpPr>
+          <p:cNvPr id="3" name="Text Placeholder 2">
+            <a:extLst>
+              <a:ext uri="{FF2B5EF4-FFF2-40B4-BE49-F238E27FC236}">
+                <a16:creationId xmlns:a16="http://schemas.microsoft.com/office/drawing/2014/main" id="{17FF5F1B-9E56-3F47-80BA-4FAACA115DF1}"/>
+              </a:ext>
+            </a:extLst>
+          </p:cNvPr>
+          <p:cNvSpPr>
+            <a:spLocks noGrp="1"/>
+          </p:cNvSpPr>
+          <p:nvPr>
+            <p:ph type="body" idx="1"/>
+          </p:nvPr>
+        </p:nvSpPr>
+        <p:spPr/>
+        <p:txBody>
+          <a:bodyPr/>
+          <a:lstStyle/>
+          <a:p>
+            <a:pPr lvl="0"/>
+            <a:r>
+              <a:rPr lang="en-US" dirty="0"/>
+              <a:t>Amazon Customer Reviews Dataset (1995-2015): </a:t>
+            </a:r>
+            <a:r>
+              <a:rPr lang="en-US" u="sng" dirty="0">
+                <a:hlinkClick r:id="rId2"/>
+              </a:rPr>
+              <a:t>https://s3.amazonaws.com/amazon-reviews-pds/readme.html</a:t>
+            </a:r>
+            <a:endParaRPr lang="en-US" dirty="0"/>
+          </a:p>
+          <a:p>
+            <a:pPr lvl="1"/>
+            <a:r>
+              <a:rPr lang="en-US" u="sng" dirty="0">
+                <a:hlinkClick r:id="rId3"/>
+              </a:rPr>
+              <a:t>https://s3.amazonaws.com/amazon-reviews-pds/tsv/index.txt</a:t>
+            </a:r>
+            <a:r>
+              <a:rPr lang="en-US" dirty="0"/>
+              <a:t> (where we can get all the tar files from) </a:t>
+            </a:r>
+          </a:p>
+          <a:p>
+            <a:pPr lvl="0"/>
+            <a:r>
+              <a:rPr lang="en-US" dirty="0"/>
+              <a:t>Amazon Reviews for Sentiment Analysis (Kaggle): </a:t>
+            </a:r>
+            <a:r>
+              <a:rPr lang="en-US" u="sng" dirty="0">
+                <a:hlinkClick r:id="rId4"/>
+              </a:rPr>
+              <a:t>https://www.kaggle.com/bittlingmayer/amazonreviews</a:t>
+            </a:r>
+            <a:r>
+              <a:rPr lang="en-US" dirty="0"/>
+              <a:t> </a:t>
+            </a:r>
+          </a:p>
+          <a:p>
+            <a:pPr lvl="0"/>
+            <a:r>
+              <a:rPr lang="en-US" dirty="0"/>
+              <a:t>Amazon Top 100 Ranked Books by Year (Kaggle):</a:t>
+            </a:r>
+          </a:p>
+          <a:p>
+            <a:r>
+              <a:rPr lang="en-US" u="sng" dirty="0">
+                <a:hlinkClick r:id="rId5"/>
+              </a:rPr>
+              <a:t>https://www.kaggle.com/jiyoungkimpf/amazon-best-sellers-of-20102020-top-100-books</a:t>
+            </a:r>
+            <a:r>
+              <a:rPr lang="en-US" dirty="0"/>
+              <a:t> </a:t>
+            </a:r>
+          </a:p>
+          <a:p>
+            <a:endParaRPr lang="en-US" dirty="0"/>
+          </a:p>
+        </p:txBody>
+      </p:sp>
+    </p:spTree>
+    <p:extLst>
+      <p:ext uri="{BB962C8B-B14F-4D97-AF65-F5344CB8AC3E}">
+        <p14:creationId xmlns:p14="http://schemas.microsoft.com/office/powerpoint/2010/main" val="2962751022"/>
+      </p:ext>
+    </p:extLst>
+  </p:cSld>
+  <p:clrMapOvr>
+    <a:masterClrMapping/>
+  </p:clrMapOvr>
+</p:sld>
+</file>
+
 <file path=ppt/slides/slide2.xml><?xml version="1.0" encoding="utf-8"?>
 <p:sld xmlns:a="http://schemas.openxmlformats.org/drawingml/2006/main" xmlns:r="http://schemas.openxmlformats.org/officeDocument/2006/relationships" xmlns:p="http://schemas.openxmlformats.org/presentationml/2006/main">
   <p:cSld>
@@ -15323,7 +15475,7 @@
           <a:p>
             <a:r>
               <a:rPr lang="en-US" dirty="0"/>
-              <a:t>Likely we look at the star rating and then at some of the customer written reviews. Utilizing these reviews piqued the interest of our team. We found Amazon customer review data freely offered by Amazon. We are pulling customer reviews for mobile electronics, non-mobile electronics, and books since these had lots of data and are common items to order from Amazon. Additionally we found a dataset that contains the top 100 ranked books on Amazon by year. </a:t>
+              <a:t>Likely we look at the star rating and then at some of the customer written reviews. Utilizing these reviews piqued the interest of our team. We found Amazon customer review data freely offered by Amazon. We are pulling customer reviews for mobile electronics, non-mobile electronics, and books since these had lots of data and are common items to order from Amazon. Additionally, we found a dataset that contains the top 100 ranked books on Amazon by year. </a:t>
             </a:r>
           </a:p>
         </p:txBody>
@@ -15423,7 +15575,7 @@
             <a:pPr lvl="1"/>
             <a:r>
               <a:rPr lang="en-US" dirty="0"/>
-              <a:t>2) reading reviews and predicting whether a book will make the top 100 rank for that year</a:t>
+              <a:t>2) reading reviews and predicting whether a book will make the Amazon top 100 rank for that year</a:t>
             </a:r>
           </a:p>
           <a:p>
@@ -15542,13 +15694,8 @@
           <a:p>
             <a:r>
               <a:rPr lang="en-US" dirty="0"/>
-              <a:t>Perform SDA/EDA, product data </a:t>
+              <a:t>Perform SDA/EDA, produce data visualizations</a:t>
             </a:r>
-            <a:r>
-              <a:rPr lang="en-US" dirty="0" err="1"/>
-              <a:t>vidualizations</a:t>
-            </a:r>
-            <a:endParaRPr lang="en-US" dirty="0"/>
           </a:p>
           <a:p>
             <a:r>
@@ -15698,10 +15845,18 @@
               <a:buChar char="▪"/>
             </a:pPr>
             <a:r>
-              <a:rPr lang="en-US"/>
-              <a:t>Remove rows with NaNs in the main columns (such as date)</a:t>
+              <a:rPr lang="en-US" dirty="0"/>
+              <a:t>Remove rows with </a:t>
             </a:r>
-            <a:endParaRPr/>
+            <a:r>
+              <a:rPr lang="en-US" dirty="0" err="1"/>
+              <a:t>NaNs</a:t>
+            </a:r>
+            <a:r>
+              <a:rPr lang="en-US" dirty="0"/>
+              <a:t> in the main columns (such as date)</a:t>
+            </a:r>
+            <a:endParaRPr dirty="0"/>
           </a:p>
           <a:p>
             <a:pPr marL="344488" lvl="0" indent="-344488" algn="l" rtl="0">
@@ -15718,10 +15873,10 @@
               <a:buChar char="▪"/>
             </a:pPr>
             <a:r>
-              <a:rPr lang="en-US"/>
+              <a:rPr lang="en-US" dirty="0"/>
               <a:t>Product Category = ‘Books’</a:t>
             </a:r>
-            <a:endParaRPr/>
+            <a:endParaRPr dirty="0"/>
           </a:p>
           <a:p>
             <a:pPr marL="344488" lvl="0" indent="-344488" algn="l" rtl="0">
@@ -15738,10 +15893,10 @@
               <a:buChar char="▪"/>
             </a:pPr>
             <a:r>
-              <a:rPr lang="en-US"/>
+              <a:rPr lang="en-US" dirty="0"/>
               <a:t>Handle emojis</a:t>
             </a:r>
-            <a:endParaRPr/>
+            <a:endParaRPr dirty="0"/>
           </a:p>
           <a:p>
             <a:pPr marL="344488" lvl="0" indent="-344488" algn="l" rtl="0">
@@ -15758,10 +15913,10 @@
               <a:buChar char="▪"/>
             </a:pPr>
             <a:r>
-              <a:rPr lang="en-US"/>
-              <a:t>Remove rows with very short review bodies? </a:t>
+              <a:rPr lang="en-US" dirty="0"/>
+              <a:t>Remove rows with very short review bodies</a:t>
             </a:r>
-            <a:endParaRPr/>
+            <a:endParaRPr dirty="0"/>
           </a:p>
           <a:p>
             <a:pPr marL="344488" lvl="0" indent="-344488" algn="l" rtl="0">
@@ -15778,10 +15933,10 @@
               <a:buChar char="▪"/>
             </a:pPr>
             <a:r>
-              <a:rPr lang="en-US"/>
+              <a:rPr lang="en-US" dirty="0"/>
               <a:t>Remove rows with review body ‘N/A’ or something similar </a:t>
             </a:r>
-            <a:endParaRPr/>
+            <a:endParaRPr dirty="0"/>
           </a:p>
           <a:p>
             <a:pPr marL="344488" lvl="0" indent="-344488" algn="l" rtl="0">
@@ -15798,10 +15953,10 @@
               <a:buChar char="▪"/>
             </a:pPr>
             <a:r>
-              <a:rPr lang="en-US"/>
+              <a:rPr lang="en-US" dirty="0"/>
               <a:t>Only keep verified purchases</a:t>
             </a:r>
-            <a:endParaRPr/>
+            <a:endParaRPr dirty="0"/>
           </a:p>
           <a:p>
             <a:pPr marL="344488" lvl="0" indent="-344488" algn="l" rtl="0">
@@ -15818,10 +15973,10 @@
               <a:buChar char="▪"/>
             </a:pPr>
             <a:r>
-              <a:rPr lang="en-US"/>
+              <a:rPr lang="en-US" dirty="0"/>
               <a:t>Clean out bad characters in review body such as breaks/newlines </a:t>
             </a:r>
-            <a:endParaRPr/>
+            <a:endParaRPr dirty="0"/>
           </a:p>
           <a:p>
             <a:pPr marL="344488" lvl="0" indent="-344488" algn="l" rtl="0">
@@ -15838,10 +15993,10 @@
               <a:buChar char="▪"/>
             </a:pPr>
             <a:r>
-              <a:rPr lang="en-US"/>
+              <a:rPr lang="en-US" dirty="0"/>
               <a:t>Look at more rows and see if there are any other issues </a:t>
             </a:r>
-            <a:endParaRPr/>
+            <a:endParaRPr dirty="0"/>
           </a:p>
         </p:txBody>
       </p:sp>
@@ -15974,10 +16129,10 @@
               <a:buChar char="▪"/>
             </a:pPr>
             <a:r>
-              <a:rPr lang="en-US"/>
+              <a:rPr lang="en-US" dirty="0"/>
               <a:t>Handle the size of the data </a:t>
             </a:r>
-            <a:endParaRPr/>
+            <a:endParaRPr dirty="0"/>
           </a:p>
           <a:p>
             <a:pPr marL="795338" lvl="1" indent="-338138" algn="l" rtl="0">
@@ -15994,10 +16149,18 @@
               <a:buChar char="▪"/>
             </a:pPr>
             <a:r>
-              <a:rPr lang="en-US"/>
-              <a:t>Dataset is 6.7GB (over 10 million rows) so we cannot load it into a Jupyter Notebook. </a:t>
+              <a:rPr lang="en-US" dirty="0"/>
+              <a:t>Dataset is 6.7GB (over 10 million rows) so we cannot load it into a </a:t>
             </a:r>
-            <a:endParaRPr/>
+            <a:r>
+              <a:rPr lang="en-US" dirty="0" err="1"/>
+              <a:t>Jupyter</a:t>
+            </a:r>
+            <a:r>
+              <a:rPr lang="en-US" dirty="0"/>
+              <a:t> Notebook. </a:t>
+            </a:r>
+            <a:endParaRPr dirty="0"/>
           </a:p>
           <a:p>
             <a:pPr marL="795338" lvl="1" indent="-338138" algn="l" rtl="0">
@@ -16014,10 +16177,10 @@
               <a:buChar char="▪"/>
             </a:pPr>
             <a:r>
-              <a:rPr lang="en-US"/>
-              <a:t>Going to decide what cleaning we want to do on a smaller set of it then write a python script to clean the whole dataset </a:t>
+              <a:rPr lang="en-US" dirty="0"/>
+              <a:t>Going to decide what cleaning we want to do (described in the slide above) on a smaller set of it then write a python script to clean the whole dataset </a:t>
             </a:r>
-            <a:endParaRPr/>
+            <a:endParaRPr dirty="0"/>
           </a:p>
           <a:p>
             <a:pPr marL="344488" lvl="0" indent="-344488" algn="l" rtl="0">
@@ -16034,10 +16197,22 @@
               <a:buChar char="▪"/>
             </a:pPr>
             <a:r>
-              <a:rPr lang="en-US"/>
+              <a:rPr lang="en-US" dirty="0"/>
               <a:t>Remove all books with fewer than N reviews </a:t>
             </a:r>
-            <a:endParaRPr/>
+          </a:p>
+          <a:p>
+            <a:pPr marL="801688" lvl="1" indent="-344488">
+              <a:spcBef>
+                <a:spcPts val="1600"/>
+              </a:spcBef>
+              <a:buSzPts val="1800"/>
+            </a:pPr>
+            <a:r>
+              <a:rPr lang="en-US" dirty="0"/>
+              <a:t>Waiting to see what the average number of reviews per book is to decide the threshold </a:t>
+            </a:r>
+            <a:endParaRPr dirty="0"/>
           </a:p>
         </p:txBody>
       </p:sp>

</xml_diff>

<commit_message>
Comments added from presentation
</commit_message>
<xml_diff>
--- a/PitchPresentationACR_Edits.pptx
+++ b/PitchPresentationACR_Edits.pptx
@@ -1113,6 +1113,103 @@
         </p:spPr>
       </p:sp>
     </p:spTree>
+  </p:cSld>
+  <p:clrMapOvr>
+    <a:masterClrMapping/>
+  </p:clrMapOvr>
+</p:notes>
+</file>
+
+<file path=ppt/notesSlides/notesSlide13.xml><?xml version="1.0" encoding="utf-8"?>
+<p:notes xmlns:a="http://schemas.openxmlformats.org/drawingml/2006/main" xmlns:r="http://schemas.openxmlformats.org/officeDocument/2006/relationships" xmlns:p="http://schemas.openxmlformats.org/presentationml/2006/main">
+  <p:cSld>
+    <p:spTree>
+      <p:nvGrpSpPr>
+        <p:cNvPr id="1" name=""/>
+        <p:cNvGrpSpPr/>
+        <p:nvPr/>
+      </p:nvGrpSpPr>
+      <p:grpSpPr>
+        <a:xfrm>
+          <a:off x="0" y="0"/>
+          <a:ext cx="0" cy="0"/>
+          <a:chOff x="0" y="0"/>
+          <a:chExt cx="0" cy="0"/>
+        </a:xfrm>
+      </p:grpSpPr>
+      <p:sp>
+        <p:nvSpPr>
+          <p:cNvPr id="2" name="Slide Image Placeholder 1"/>
+          <p:cNvSpPr>
+            <a:spLocks noGrp="1" noRot="1" noChangeAspect="1"/>
+          </p:cNvSpPr>
+          <p:nvPr>
+            <p:ph type="sldImg"/>
+          </p:nvPr>
+        </p:nvSpPr>
+        <p:spPr>
+          <a:xfrm>
+            <a:off x="381000" y="685800"/>
+            <a:ext cx="6096000" cy="3429000"/>
+          </a:xfrm>
+        </p:spPr>
+      </p:sp>
+      <p:sp>
+        <p:nvSpPr>
+          <p:cNvPr id="3" name="Notes Placeholder 2"/>
+          <p:cNvSpPr>
+            <a:spLocks noGrp="1"/>
+          </p:cNvSpPr>
+          <p:nvPr>
+            <p:ph type="body" idx="1"/>
+          </p:nvPr>
+        </p:nvSpPr>
+        <p:spPr/>
+        <p:txBody>
+          <a:bodyPr/>
+          <a:lstStyle/>
+          <a:p>
+            <a:r>
+              <a:rPr lang="en-US" dirty="0"/>
+              <a:t>Do any type of EDA that we want</a:t>
+            </a:r>
+          </a:p>
+          <a:p>
+            <a:r>
+              <a:rPr lang="en-US" dirty="0"/>
+              <a:t>Show some statistical analysis</a:t>
+            </a:r>
+          </a:p>
+          <a:p>
+            <a:r>
+              <a:rPr lang="en-US" dirty="0"/>
+              <a:t>Try NLP/data visualizations in the next meeting </a:t>
+            </a:r>
+          </a:p>
+          <a:p>
+            <a:r>
+              <a:rPr lang="en-US" dirty="0"/>
+              <a:t>Rank of products by number of reviews </a:t>
+            </a:r>
+          </a:p>
+          <a:p>
+            <a:r>
+              <a:rPr lang="en-US" dirty="0"/>
+              <a:t>Focus on bag </a:t>
+            </a:r>
+            <a:r>
+              <a:rPr lang="en-US"/>
+              <a:t>of words</a:t>
+            </a:r>
+          </a:p>
+        </p:txBody>
+      </p:sp>
+    </p:spTree>
+    <p:extLst>
+      <p:ext uri="{BB962C8B-B14F-4D97-AF65-F5344CB8AC3E}">
+        <p14:creationId xmlns:p14="http://schemas.microsoft.com/office/powerpoint/2010/main" val="3177796109"/>
+      </p:ext>
+    </p:extLst>
   </p:cSld>
   <p:clrMapOvr>
     <a:masterClrMapping/>
@@ -15294,7 +15391,7 @@
             </a:r>
             <a:r>
               <a:rPr lang="en-US" u="sng" dirty="0">
-                <a:hlinkClick r:id="rId2"/>
+                <a:hlinkClick r:id="rId3"/>
               </a:rPr>
               <a:t>https://s3.amazonaws.com/amazon-reviews-pds/readme.html</a:t>
             </a:r>
@@ -15304,7 +15401,7 @@
             <a:pPr lvl="1"/>
             <a:r>
               <a:rPr lang="en-US" u="sng" dirty="0">
-                <a:hlinkClick r:id="rId3"/>
+                <a:hlinkClick r:id="rId4"/>
               </a:rPr>
               <a:t>https://s3.amazonaws.com/amazon-reviews-pds/tsv/index.txt</a:t>
             </a:r>
@@ -15321,7 +15418,7 @@
             </a:r>
             <a:r>
               <a:rPr lang="en-US" u="sng" dirty="0">
-                <a:hlinkClick r:id="rId4"/>
+                <a:hlinkClick r:id="rId5"/>
               </a:rPr>
               <a:t>https://www.kaggle.com/bittlingmayer/amazonreviews</a:t>
             </a:r>
@@ -15340,7 +15437,7 @@
           <a:p>
             <a:r>
               <a:rPr lang="en-US" u="sng" dirty="0">
-                <a:hlinkClick r:id="rId5"/>
+                <a:hlinkClick r:id="rId6"/>
               </a:rPr>
               <a:t>https://www.kaggle.com/jiyoungkimpf/amazon-best-sellers-of-20102020-top-100-books</a:t>
             </a:r>
@@ -15894,7 +15991,7 @@
             </a:pPr>
             <a:r>
               <a:rPr lang="en-US" dirty="0"/>
-              <a:t>Handle emojis</a:t>
+              <a:t>Handle emojis *</a:t>
             </a:r>
             <a:endParaRPr dirty="0"/>
           </a:p>
@@ -15914,7 +16011,7 @@
             </a:pPr>
             <a:r>
               <a:rPr lang="en-US" dirty="0"/>
-              <a:t>Remove rows with very short review bodies</a:t>
+              <a:t>Remove rows with very short review bodies *</a:t>
             </a:r>
             <a:endParaRPr dirty="0"/>
           </a:p>
@@ -15974,7 +16071,7 @@
             </a:pPr>
             <a:r>
               <a:rPr lang="en-US" dirty="0"/>
-              <a:t>Clean out bad characters in review body such as breaks/newlines </a:t>
+              <a:t>Clean out bad characters in review body such as breaks/newlines *</a:t>
             </a:r>
             <a:endParaRPr dirty="0"/>
           </a:p>

</xml_diff>